<commit_message>
small changes in resume
</commit_message>
<xml_diff>
--- a/public/resume.pptx
+++ b/public/resume.pptx
@@ -5029,7 +5029,18 @@
                 <a:ea typeface="Geneva" panose="020B0503030404040204" pitchFamily="34" charset="0"/>
                 <a:cs typeface="Verdana" panose="020B0604030504040204" pitchFamily="34" charset="0"/>
               </a:rPr>
-              <a:t>“Functional screening identifies novel miRNAs inhibiting Vascular Smooth Muscle Cell proliferation” </a:t>
+              <a:t>Functional screening identifies novel miRNAs inhibiting Vascular Smooth Muscle </a:t>
+            </a:r>
+            <a:r>
+              <a:rPr lang="en-GB" sz="600" b="1" spc="30">
+                <a:solidFill>
+                  <a:srgbClr val="5F6060"/>
+                </a:solidFill>
+                <a:latin typeface="Geneva" panose="020B0503030404040204" pitchFamily="34" charset="0"/>
+                <a:ea typeface="Geneva" panose="020B0503030404040204" pitchFamily="34" charset="0"/>
+                <a:cs typeface="Verdana" panose="020B0604030504040204" pitchFamily="34" charset="0"/>
+              </a:rPr>
+              <a:t>Cell proliferation </a:t>
             </a:r>
             <a:r>
               <a:rPr lang="en-GB" sz="600" spc="30" dirty="0">
@@ -5080,7 +5091,7 @@
                 <a:ea typeface="Geneva" panose="020B0503030404040204" pitchFamily="34" charset="0"/>
                 <a:cs typeface="Verdana" panose="020B0604030504040204" pitchFamily="34" charset="0"/>
               </a:rPr>
-              <a:t>“Vascular smooth cell function and dysfunction controlled by non-coding RNA” </a:t>
+              <a:t>Vascular smooth cell function and dysfunction controlled by non-coding RNA </a:t>
             </a:r>
             <a:r>
               <a:rPr lang="en-GB" sz="600" spc="30" dirty="0">
@@ -5131,7 +5142,7 @@
                 <a:ea typeface="Geneva" panose="020B0503030404040204" pitchFamily="34" charset="0"/>
                 <a:cs typeface="Verdana" panose="020B0604030504040204" pitchFamily="34" charset="0"/>
               </a:rPr>
-              <a:t>"Extracellular vesicles from a human embryonic stem cell-derived endothelial cell product induce angiogenesis with high efficiency at very low input and contain miRNAs with novel proangiogenic function”</a:t>
+              <a:t>Extracellular vesicles from a human embryonic stem cell-derived endothelial cell product induce angiogenesis with high efficiency at very low input and contain miRNAs with novel proangiogenic function</a:t>
             </a:r>
             <a:r>
               <a:rPr lang="en-GB" sz="600" spc="30" dirty="0">
@@ -5177,7 +5188,7 @@
               </a:spcAft>
             </a:pPr>
             <a:r>
-              <a:rPr lang="en-GB" sz="600" i="1" spc="30" dirty="0">
+              <a:rPr lang="en-GB" sz="600" spc="30" dirty="0">
                 <a:solidFill>
                   <a:srgbClr val="5F6060"/>
                 </a:solidFill>

</xml_diff>

<commit_message>
changed color and photo
</commit_message>
<xml_diff>
--- a/public/resume.pptx
+++ b/public/resume.pptx
@@ -3702,7 +3702,29 @@
                 <a:ea typeface="Geneva" panose="020B0503030404040204" pitchFamily="34" charset="0"/>
                 <a:cs typeface="Verdana" panose="020B0604030504040204" pitchFamily="34" charset="0"/>
               </a:rPr>
-              <a:t>R, Python, Bash scripting, </a:t>
+              <a:t>R (</a:t>
+            </a:r>
+            <a:r>
+              <a:rPr lang="en-US" sz="600" spc="30" dirty="0" err="1">
+                <a:solidFill>
+                  <a:srgbClr val="4F5050"/>
+                </a:solidFill>
+                <a:latin typeface="Geneva" panose="020B0503030404040204" pitchFamily="34" charset="0"/>
+                <a:ea typeface="Geneva" panose="020B0503030404040204" pitchFamily="34" charset="0"/>
+                <a:cs typeface="Verdana" panose="020B0604030504040204" pitchFamily="34" charset="0"/>
+              </a:rPr>
+              <a:t>tidyverse</a:t>
+            </a:r>
+            <a:r>
+              <a:rPr lang="en-US" sz="600" spc="30" dirty="0">
+                <a:solidFill>
+                  <a:srgbClr val="4F5050"/>
+                </a:solidFill>
+                <a:latin typeface="Geneva" panose="020B0503030404040204" pitchFamily="34" charset="0"/>
+                <a:ea typeface="Geneva" panose="020B0503030404040204" pitchFamily="34" charset="0"/>
+                <a:cs typeface="Verdana" panose="020B0604030504040204" pitchFamily="34" charset="0"/>
+              </a:rPr>
+              <a:t>, Bioconductor + more), Python (Pandas, NumPy + more), Bash scripting, </a:t>
             </a:r>
             <a:r>
               <a:rPr lang="en-GB" sz="600" spc="30" dirty="0">
@@ -3713,7 +3735,18 @@
                 <a:ea typeface="Geneva" panose="020B0503030404040204" pitchFamily="34" charset="0"/>
                 <a:cs typeface="Verdana" panose="020B0604030504040204" pitchFamily="34" charset="0"/>
               </a:rPr>
-              <a:t>NextFlow, Node.js, React, </a:t>
+              <a:t>NextFlow, Node.js, </a:t>
+            </a:r>
+            <a:r>
+              <a:rPr lang="en-GB" sz="600" spc="30">
+                <a:solidFill>
+                  <a:srgbClr val="4F5050"/>
+                </a:solidFill>
+                <a:latin typeface="Geneva" panose="020B0503030404040204" pitchFamily="34" charset="0"/>
+                <a:ea typeface="Geneva" panose="020B0503030404040204" pitchFamily="34" charset="0"/>
+                <a:cs typeface="Verdana" panose="020B0604030504040204" pitchFamily="34" charset="0"/>
+              </a:rPr>
+              <a:t>React, D3, </a:t>
             </a:r>
             <a:r>
               <a:rPr lang="en-US" sz="600" spc="30" dirty="0">
@@ -3789,7 +3822,29 @@
                 <a:ea typeface="Geneva" panose="020B0503030404040204" pitchFamily="34" charset="0"/>
                 <a:cs typeface="Verdana" panose="020B0604030504040204" pitchFamily="34" charset="0"/>
               </a:rPr>
-              <a:t>bulk/small/single cell RNAseq analysis</a:t>
+              <a:t>bulk/small/single cell RNA-</a:t>
+            </a:r>
+            <a:r>
+              <a:rPr lang="en-GB" sz="600" spc="30" dirty="0" err="1">
+                <a:solidFill>
+                  <a:srgbClr val="4F5050"/>
+                </a:solidFill>
+                <a:latin typeface="Geneva" panose="020B0503030404040204" pitchFamily="34" charset="0"/>
+                <a:ea typeface="Geneva" panose="020B0503030404040204" pitchFamily="34" charset="0"/>
+                <a:cs typeface="Verdana" panose="020B0604030504040204" pitchFamily="34" charset="0"/>
+              </a:rPr>
+              <a:t>seq</a:t>
+            </a:r>
+            <a:r>
+              <a:rPr lang="en-GB" sz="600" spc="30" dirty="0">
+                <a:solidFill>
+                  <a:srgbClr val="4F5050"/>
+                </a:solidFill>
+                <a:latin typeface="Geneva" panose="020B0503030404040204" pitchFamily="34" charset="0"/>
+                <a:ea typeface="Geneva" panose="020B0503030404040204" pitchFamily="34" charset="0"/>
+                <a:cs typeface="Verdana" panose="020B0604030504040204" pitchFamily="34" charset="0"/>
+              </a:rPr>
+              <a:t> analysis</a:t>
             </a:r>
           </a:p>
           <a:p>
@@ -3951,7 +4006,29 @@
                 <a:ea typeface="Geneva" panose="020B0503030404040204" pitchFamily="34" charset="0"/>
                 <a:cs typeface="Verdana" panose="020B0604030504040204" pitchFamily="34" charset="0"/>
               </a:rPr>
-              <a:t>Differential expression analysis, single cell RNAseq clustering/marker identification/integration, gene set enrichment analyses</a:t>
+              <a:t>Differential expression analysis, single cell RNA-</a:t>
+            </a:r>
+            <a:r>
+              <a:rPr lang="en-GB" sz="600" spc="30" dirty="0" err="1">
+                <a:solidFill>
+                  <a:srgbClr val="4F5050"/>
+                </a:solidFill>
+                <a:latin typeface="Geneva" panose="020B0503030404040204" pitchFamily="34" charset="0"/>
+                <a:ea typeface="Geneva" panose="020B0503030404040204" pitchFamily="34" charset="0"/>
+                <a:cs typeface="Verdana" panose="020B0604030504040204" pitchFamily="34" charset="0"/>
+              </a:rPr>
+              <a:t>seq</a:t>
+            </a:r>
+            <a:r>
+              <a:rPr lang="en-GB" sz="600" spc="30" dirty="0">
+                <a:solidFill>
+                  <a:srgbClr val="4F5050"/>
+                </a:solidFill>
+                <a:latin typeface="Geneva" panose="020B0503030404040204" pitchFamily="34" charset="0"/>
+                <a:ea typeface="Geneva" panose="020B0503030404040204" pitchFamily="34" charset="0"/>
+                <a:cs typeface="Verdana" panose="020B0604030504040204" pitchFamily="34" charset="0"/>
+              </a:rPr>
+              <a:t> clustering/marker identification/integration, gene set enrichment analyses</a:t>
             </a:r>
           </a:p>
           <a:p>
@@ -4037,7 +4114,18 @@
                 <a:ea typeface="Geneva" panose="020B0503030404040204" pitchFamily="34" charset="0"/>
                 <a:cs typeface="Verdana" panose="020B0604030504040204" pitchFamily="34" charset="0"/>
               </a:rPr>
-              <a:t> vascular smooth muscle &amp; endothelial cells, embryonic stem cells, HeLa, HEK293T, human vein tissue</a:t>
+              <a:t> vascular smooth muscle &amp; endothelial cells, embryonic stem cells, HeLa, HEK293T, human vein tissue, </a:t>
+            </a:r>
+            <a:r>
+              <a:rPr lang="en-GB" sz="600" i="1" spc="30" dirty="0">
+                <a:solidFill>
+                  <a:srgbClr val="4F5050"/>
+                </a:solidFill>
+                <a:latin typeface="Geneva" panose="020B0503030404040204" pitchFamily="34" charset="0"/>
+                <a:ea typeface="Geneva" panose="020B0503030404040204" pitchFamily="34" charset="0"/>
+                <a:cs typeface="Verdana" panose="020B0604030504040204" pitchFamily="34" charset="0"/>
+              </a:rPr>
+              <a:t>S. pombe</a:t>
             </a:r>
           </a:p>
           <a:p>
@@ -4069,18 +4157,7 @@
                 <a:ea typeface="Geneva" panose="020B0503030404040204" pitchFamily="34" charset="0"/>
                 <a:cs typeface="Verdana" panose="020B0604030504040204" pitchFamily="34" charset="0"/>
               </a:rPr>
-              <a:t>RNA extraction, RT-qPCR, immuno-histochemistry/fluorescence, western blot, X-gal staining, FACS, transfections, </a:t>
-            </a:r>
-            <a:r>
-              <a:rPr lang="en-GB" sz="600" spc="30" dirty="0" err="1">
-                <a:solidFill>
-                  <a:srgbClr val="4F5050"/>
-                </a:solidFill>
-                <a:latin typeface="Geneva" panose="020B0503030404040204" pitchFamily="34" charset="0"/>
-                <a:ea typeface="Geneva" panose="020B0503030404040204" pitchFamily="34" charset="0"/>
-                <a:cs typeface="Verdana" panose="020B0604030504040204" pitchFamily="34" charset="0"/>
-              </a:rPr>
-              <a:t>nuceofections</a:t>
+              <a:t>RNA extraction, RT-qPCR, cloning, transfections, nucleofections, immuno-histochemistry/fluorescence, western blot, X-gal staining, FACS</a:t>
             </a:r>
             <a:endParaRPr lang="en-US" sz="600" b="1" spc="30" dirty="0">
               <a:solidFill>
@@ -4181,7 +4258,51 @@
                 <a:ea typeface="Geneva" panose="020B0503030404040204" pitchFamily="34" charset="0"/>
                 <a:cs typeface="Verdana" panose="020B0604030504040204" pitchFamily="34" charset="0"/>
               </a:rPr>
-              <a:t> Identification of novel therapeutic miRNAs for vein graft failure – in vitro &amp; in silico </a:t>
+              <a:t> Identification of novel therapeutic miRNAs for vein graft failure – </a:t>
+            </a:r>
+            <a:r>
+              <a:rPr lang="en-GB" sz="600" i="1" spc="30" dirty="0">
+                <a:solidFill>
+                  <a:srgbClr val="4F5050"/>
+                </a:solidFill>
+                <a:latin typeface="Geneva" panose="020B0503030404040204" pitchFamily="34" charset="0"/>
+                <a:ea typeface="Geneva" panose="020B0503030404040204" pitchFamily="34" charset="0"/>
+                <a:cs typeface="Verdana" panose="020B0604030504040204" pitchFamily="34" charset="0"/>
+              </a:rPr>
+              <a:t>in vitro</a:t>
+            </a:r>
+            <a:r>
+              <a:rPr lang="en-GB" sz="600" spc="30" dirty="0">
+                <a:solidFill>
+                  <a:srgbClr val="4F5050"/>
+                </a:solidFill>
+                <a:latin typeface="Geneva" panose="020B0503030404040204" pitchFamily="34" charset="0"/>
+                <a:ea typeface="Geneva" panose="020B0503030404040204" pitchFamily="34" charset="0"/>
+                <a:cs typeface="Verdana" panose="020B0604030504040204" pitchFamily="34" charset="0"/>
+              </a:rPr>
+              <a:t> &amp; </a:t>
+            </a:r>
+            <a:r>
+              <a:rPr lang="en-GB" sz="600" i="1" spc="30" dirty="0">
+                <a:solidFill>
+                  <a:srgbClr val="4F5050"/>
+                </a:solidFill>
+                <a:latin typeface="Geneva" panose="020B0503030404040204" pitchFamily="34" charset="0"/>
+                <a:ea typeface="Geneva" panose="020B0503030404040204" pitchFamily="34" charset="0"/>
+                <a:cs typeface="Verdana" panose="020B0604030504040204" pitchFamily="34" charset="0"/>
+              </a:rPr>
+              <a:t>in silico</a:t>
+            </a:r>
+            <a:r>
+              <a:rPr lang="en-GB" sz="600" spc="30" dirty="0">
+                <a:solidFill>
+                  <a:srgbClr val="4F5050"/>
+                </a:solidFill>
+                <a:latin typeface="Geneva" panose="020B0503030404040204" pitchFamily="34" charset="0"/>
+                <a:ea typeface="Geneva" panose="020B0503030404040204" pitchFamily="34" charset="0"/>
+                <a:cs typeface="Verdana" panose="020B0604030504040204" pitchFamily="34" charset="0"/>
+              </a:rPr>
+              <a:t> </a:t>
             </a:r>
           </a:p>
           <a:p>
@@ -4221,7 +4342,73 @@
                 <a:ea typeface="Geneva" panose="020B0503030404040204" pitchFamily="34" charset="0"/>
                 <a:cs typeface="Verdana" panose="020B0604030504040204" pitchFamily="34" charset="0"/>
               </a:rPr>
-              <a:t>Evaluated the top candidates as potential therapeutics &amp; studied their mechanism of action (in vitro / ex vivo / RNAseq) </a:t>
+              <a:t>Evaluated the top candidates as potential therapeutics &amp; studied their mechanism of action (</a:t>
+            </a:r>
+            <a:r>
+              <a:rPr lang="en-GB" sz="600" i="1" spc="30" dirty="0">
+                <a:solidFill>
+                  <a:srgbClr val="4F5050"/>
+                </a:solidFill>
+                <a:latin typeface="Geneva" panose="020B0503030404040204" pitchFamily="34" charset="0"/>
+                <a:ea typeface="Geneva" panose="020B0503030404040204" pitchFamily="34" charset="0"/>
+                <a:cs typeface="Verdana" panose="020B0604030504040204" pitchFamily="34" charset="0"/>
+              </a:rPr>
+              <a:t>in vitro</a:t>
+            </a:r>
+            <a:r>
+              <a:rPr lang="en-GB" sz="600" spc="30" dirty="0">
+                <a:solidFill>
+                  <a:srgbClr val="4F5050"/>
+                </a:solidFill>
+                <a:latin typeface="Geneva" panose="020B0503030404040204" pitchFamily="34" charset="0"/>
+                <a:ea typeface="Geneva" panose="020B0503030404040204" pitchFamily="34" charset="0"/>
+                <a:cs typeface="Verdana" panose="020B0604030504040204" pitchFamily="34" charset="0"/>
+              </a:rPr>
+              <a:t> / </a:t>
+            </a:r>
+            <a:r>
+              <a:rPr lang="en-GB" sz="600" i="1" spc="30" dirty="0">
+                <a:solidFill>
+                  <a:srgbClr val="4F5050"/>
+                </a:solidFill>
+                <a:latin typeface="Geneva" panose="020B0503030404040204" pitchFamily="34" charset="0"/>
+                <a:ea typeface="Geneva" panose="020B0503030404040204" pitchFamily="34" charset="0"/>
+                <a:cs typeface="Verdana" panose="020B0604030504040204" pitchFamily="34" charset="0"/>
+              </a:rPr>
+              <a:t>ex vivo</a:t>
+            </a:r>
+            <a:r>
+              <a:rPr lang="en-GB" sz="600" spc="30" dirty="0">
+                <a:solidFill>
+                  <a:srgbClr val="4F5050"/>
+                </a:solidFill>
+                <a:latin typeface="Geneva" panose="020B0503030404040204" pitchFamily="34" charset="0"/>
+                <a:ea typeface="Geneva" panose="020B0503030404040204" pitchFamily="34" charset="0"/>
+                <a:cs typeface="Verdana" panose="020B0604030504040204" pitchFamily="34" charset="0"/>
+              </a:rPr>
+              <a:t> / RNA-</a:t>
+            </a:r>
+            <a:r>
+              <a:rPr lang="en-GB" sz="600" spc="30" dirty="0" err="1">
+                <a:solidFill>
+                  <a:srgbClr val="4F5050"/>
+                </a:solidFill>
+                <a:latin typeface="Geneva" panose="020B0503030404040204" pitchFamily="34" charset="0"/>
+                <a:ea typeface="Geneva" panose="020B0503030404040204" pitchFamily="34" charset="0"/>
+                <a:cs typeface="Verdana" panose="020B0604030504040204" pitchFamily="34" charset="0"/>
+              </a:rPr>
+              <a:t>seq</a:t>
+            </a:r>
+            <a:r>
+              <a:rPr lang="en-GB" sz="600" spc="30" dirty="0">
+                <a:solidFill>
+                  <a:srgbClr val="4F5050"/>
+                </a:solidFill>
+                <a:latin typeface="Geneva" panose="020B0503030404040204" pitchFamily="34" charset="0"/>
+                <a:ea typeface="Geneva" panose="020B0503030404040204" pitchFamily="34" charset="0"/>
+                <a:cs typeface="Verdana" panose="020B0604030504040204" pitchFamily="34" charset="0"/>
+              </a:rPr>
+              <a:t>) </a:t>
             </a:r>
           </a:p>
           <a:p>
@@ -4273,7 +4460,40 @@
                 <a:ea typeface="Geneva" panose="020B0503030404040204" pitchFamily="34" charset="0"/>
                 <a:cs typeface="Verdana" panose="020B0604030504040204" pitchFamily="34" charset="0"/>
               </a:rPr>
-              <a:t> Studying endogenous miRNA loci dysregulated in response to injurious stimuli in vascular smooth muscle cells – in vitro &amp; in silico</a:t>
+              <a:t> Studying endogenous miRNA loci dysregulated in response to injurious stimuli in vascular smooth muscle cells – </a:t>
+            </a:r>
+            <a:r>
+              <a:rPr lang="en-GB" sz="600" i="1" spc="30" dirty="0">
+                <a:solidFill>
+                  <a:srgbClr val="4F5050"/>
+                </a:solidFill>
+                <a:latin typeface="Geneva" panose="020B0503030404040204" pitchFamily="34" charset="0"/>
+                <a:ea typeface="Geneva" panose="020B0503030404040204" pitchFamily="34" charset="0"/>
+                <a:cs typeface="Verdana" panose="020B0604030504040204" pitchFamily="34" charset="0"/>
+              </a:rPr>
+              <a:t>in vitro</a:t>
+            </a:r>
+            <a:r>
+              <a:rPr lang="en-GB" sz="600" spc="30" dirty="0">
+                <a:solidFill>
+                  <a:srgbClr val="4F5050"/>
+                </a:solidFill>
+                <a:latin typeface="Geneva" panose="020B0503030404040204" pitchFamily="34" charset="0"/>
+                <a:ea typeface="Geneva" panose="020B0503030404040204" pitchFamily="34" charset="0"/>
+                <a:cs typeface="Verdana" panose="020B0604030504040204" pitchFamily="34" charset="0"/>
+              </a:rPr>
+              <a:t> &amp; </a:t>
+            </a:r>
+            <a:r>
+              <a:rPr lang="en-GB" sz="600" i="1" spc="30" dirty="0">
+                <a:solidFill>
+                  <a:srgbClr val="4F5050"/>
+                </a:solidFill>
+                <a:latin typeface="Geneva" panose="020B0503030404040204" pitchFamily="34" charset="0"/>
+                <a:ea typeface="Geneva" panose="020B0503030404040204" pitchFamily="34" charset="0"/>
+                <a:cs typeface="Verdana" panose="020B0604030504040204" pitchFamily="34" charset="0"/>
+              </a:rPr>
+              <a:t>in silico</a:t>
             </a:r>
           </a:p>
           <a:p>
@@ -4345,7 +4565,29 @@
                 <a:ea typeface="Geneva" panose="020B0503030404040204" pitchFamily="34" charset="0"/>
                 <a:cs typeface="Verdana" panose="020B0604030504040204" pitchFamily="34" charset="0"/>
               </a:rPr>
-              <a:t> Evaluation of all human miRNAs by predicting processing efficiency – in silico </a:t>
+              <a:t> Evaluation of all human miRNAs by predicting processing efficiency – </a:t>
+            </a:r>
+            <a:r>
+              <a:rPr lang="en-GB" sz="600" i="1" spc="30" dirty="0">
+                <a:solidFill>
+                  <a:srgbClr val="4F5050"/>
+                </a:solidFill>
+                <a:latin typeface="Geneva" panose="020B0503030404040204" pitchFamily="34" charset="0"/>
+                <a:ea typeface="Geneva" panose="020B0503030404040204" pitchFamily="34" charset="0"/>
+                <a:cs typeface="Verdana" panose="020B0604030504040204" pitchFamily="34" charset="0"/>
+              </a:rPr>
+              <a:t>in silico</a:t>
+            </a:r>
+            <a:r>
+              <a:rPr lang="en-GB" sz="600" spc="30" dirty="0">
+                <a:solidFill>
+                  <a:srgbClr val="4F5050"/>
+                </a:solidFill>
+                <a:latin typeface="Geneva" panose="020B0503030404040204" pitchFamily="34" charset="0"/>
+                <a:ea typeface="Geneva" panose="020B0503030404040204" pitchFamily="34" charset="0"/>
+                <a:cs typeface="Verdana" panose="020B0604030504040204" pitchFamily="34" charset="0"/>
+              </a:rPr>
+              <a:t> </a:t>
             </a:r>
           </a:p>
           <a:p>
@@ -4424,7 +4666,29 @@
                 <a:ea typeface="Geneva" panose="020B0503030404040204" pitchFamily="34" charset="0"/>
                 <a:cs typeface="Verdana" panose="020B0604030504040204" pitchFamily="34" charset="0"/>
               </a:rPr>
-              <a:t>Extracellular vesicle isolation and RNA-sequencing analysis of their contents</a:t>
+              <a:t>Extracellular vesicle isolation and RNA-</a:t>
+            </a:r>
+            <a:r>
+              <a:rPr lang="en-GB" sz="600" spc="30" dirty="0" err="1">
+                <a:solidFill>
+                  <a:srgbClr val="4F5050"/>
+                </a:solidFill>
+                <a:latin typeface="Geneva" panose="020B0503030404040204" pitchFamily="34" charset="0"/>
+                <a:ea typeface="Geneva" panose="020B0503030404040204" pitchFamily="34" charset="0"/>
+                <a:cs typeface="Verdana" panose="020B0604030504040204" pitchFamily="34" charset="0"/>
+              </a:rPr>
+              <a:t>seq</a:t>
+            </a:r>
+            <a:r>
+              <a:rPr lang="en-GB" sz="600" spc="30" dirty="0">
+                <a:solidFill>
+                  <a:srgbClr val="4F5050"/>
+                </a:solidFill>
+                <a:latin typeface="Geneva" panose="020B0503030404040204" pitchFamily="34" charset="0"/>
+                <a:ea typeface="Geneva" panose="020B0503030404040204" pitchFamily="34" charset="0"/>
+                <a:cs typeface="Verdana" panose="020B0604030504040204" pitchFamily="34" charset="0"/>
+              </a:rPr>
+              <a:t> analysis of their contents</a:t>
             </a:r>
             <a:endParaRPr lang="en-GB" sz="700" b="1" spc="30" dirty="0">
               <a:solidFill>
@@ -4442,6 +4706,17 @@
               </a:spcBef>
             </a:pPr>
             <a:r>
+              <a:rPr lang="en-US" sz="600" b="1" spc="30" dirty="0" err="1">
+                <a:solidFill>
+                  <a:srgbClr val="4F5050"/>
+                </a:solidFill>
+                <a:latin typeface="Geneva" panose="020B0503030404040204" pitchFamily="34" charset="0"/>
+                <a:ea typeface="Geneva" panose="020B0503030404040204" pitchFamily="34" charset="0"/>
+                <a:cs typeface="Verdana" panose="020B0604030504040204" pitchFamily="34" charset="0"/>
+              </a:rPr>
+              <a:t>Multiomics</a:t>
+            </a:r>
+            <a:r>
               <a:rPr lang="en-US" sz="600" b="1" spc="30" dirty="0">
                 <a:solidFill>
                   <a:srgbClr val="4F5050"/>
@@ -4450,7 +4725,7 @@
                 <a:ea typeface="Geneva" panose="020B0503030404040204" pitchFamily="34" charset="0"/>
                 <a:cs typeface="Verdana" panose="020B0604030504040204" pitchFamily="34" charset="0"/>
               </a:rPr>
-              <a:t>Multiomics pipeline development for cancer precision medicine | </a:t>
+              <a:t> pipeline development for cancer precision medicine | </a:t>
             </a:r>
             <a:r>
               <a:rPr lang="en-US" sz="600" spc="30" dirty="0">
@@ -4484,7 +4759,29 @@
                 <a:ea typeface="Geneva" panose="020B0503030404040204" pitchFamily="34" charset="0"/>
                 <a:cs typeface="Verdana" panose="020B0604030504040204" pitchFamily="34" charset="0"/>
               </a:rPr>
-              <a:t>Constructed multimodal multiomics pipelines including genomics, epigenomics, transcriptomics and proteomics datasets</a:t>
+              <a:t>Constructed multimodal </a:t>
+            </a:r>
+            <a:r>
+              <a:rPr lang="en-GB" sz="600" spc="30" dirty="0" err="1">
+                <a:solidFill>
+                  <a:srgbClr val="4F5050"/>
+                </a:solidFill>
+                <a:latin typeface="Geneva" panose="020B0503030404040204" pitchFamily="34" charset="0"/>
+                <a:ea typeface="Geneva" panose="020B0503030404040204" pitchFamily="34" charset="0"/>
+                <a:cs typeface="Verdana" panose="020B0604030504040204" pitchFamily="34" charset="0"/>
+              </a:rPr>
+              <a:t>multiomics</a:t>
+            </a:r>
+            <a:r>
+              <a:rPr lang="en-GB" sz="600" spc="30" dirty="0">
+                <a:solidFill>
+                  <a:srgbClr val="4F5050"/>
+                </a:solidFill>
+                <a:latin typeface="Geneva" panose="020B0503030404040204" pitchFamily="34" charset="0"/>
+                <a:ea typeface="Geneva" panose="020B0503030404040204" pitchFamily="34" charset="0"/>
+                <a:cs typeface="Verdana" panose="020B0604030504040204" pitchFamily="34" charset="0"/>
+              </a:rPr>
+              <a:t> pipelines including genomics, epigenomics, transcriptomics and proteomics datasets</a:t>
             </a:r>
             <a:endParaRPr lang="en-US" sz="600" b="1" spc="30" dirty="0">
               <a:solidFill>
@@ -4547,7 +4844,7 @@
                 <a:ea typeface="Geneva" panose="020B0503030404040204" pitchFamily="34" charset="0"/>
                 <a:cs typeface="Verdana" panose="020B0604030504040204" pitchFamily="34" charset="0"/>
               </a:rPr>
-              <a:t>Generation of clinical-grade Adenovirus 5-based vectors for miRNA therapy.</a:t>
+              <a:t>Generation of clinical-grade Adenovirus 5-based vectors</a:t>
             </a:r>
             <a:endParaRPr lang="en-US" sz="600" b="1" spc="30" dirty="0">
               <a:solidFill>
@@ -4610,9 +4907,20 @@
                 <a:ea typeface="Geneva" panose="020B0503030404040204" pitchFamily="34" charset="0"/>
                 <a:cs typeface="Verdana" panose="020B0604030504040204" pitchFamily="34" charset="0"/>
               </a:rPr>
-              <a:t>Structure-function analysis of the DNA helicase factor Cdc45 in Saccharomyces pombe</a:t>
-            </a:r>
-            <a:endParaRPr lang="en-US" sz="600" spc="30" dirty="0">
+              <a:t>Structure-function analysis of the DNA helicase factor Cdc45 in </a:t>
+            </a:r>
+            <a:r>
+              <a:rPr lang="en-GB" sz="600" i="1" spc="30" dirty="0">
+                <a:solidFill>
+                  <a:srgbClr val="4F5050"/>
+                </a:solidFill>
+                <a:latin typeface="Geneva" panose="020B0503030404040204" pitchFamily="34" charset="0"/>
+                <a:ea typeface="Geneva" panose="020B0503030404040204" pitchFamily="34" charset="0"/>
+                <a:cs typeface="Verdana" panose="020B0604030504040204" pitchFamily="34" charset="0"/>
+              </a:rPr>
+              <a:t>Saccharomyces pombe</a:t>
+            </a:r>
+            <a:endParaRPr lang="en-US" sz="600" i="1" spc="30" dirty="0">
               <a:solidFill>
                 <a:srgbClr val="4F5050"/>
               </a:solidFill>
@@ -4630,6 +4938,17 @@
               <a:buChar char="•"/>
             </a:pPr>
             <a:r>
+              <a:rPr lang="en-US" sz="600" i="1" spc="30" dirty="0">
+                <a:solidFill>
+                  <a:srgbClr val="4F5050"/>
+                </a:solidFill>
+                <a:latin typeface="Geneva" panose="020B0503030404040204" pitchFamily="34" charset="0"/>
+                <a:ea typeface="Geneva" panose="020B0503030404040204" pitchFamily="34" charset="0"/>
+                <a:cs typeface="Verdana" panose="020B0604030504040204" pitchFamily="34" charset="0"/>
+              </a:rPr>
+              <a:t>S. pombe </a:t>
+            </a:r>
+            <a:r>
               <a:rPr lang="en-US" sz="600" spc="30" dirty="0">
                 <a:solidFill>
                   <a:srgbClr val="4F5050"/>
@@ -4638,7 +4957,7 @@
                 <a:ea typeface="Geneva" panose="020B0503030404040204" pitchFamily="34" charset="0"/>
                 <a:cs typeface="Verdana" panose="020B0604030504040204" pitchFamily="34" charset="0"/>
               </a:rPr>
-              <a:t>S. pombe culture and Cre-lox-mediated insertion of Cdc45 mutants generated by error-prone PCR &amp; tertiary protein structure modelling of temperature-sensitive Cdc45 mutants (PyMOL).</a:t>
+              <a:t>culture and Cre-lox-mediated insertion of Cdc45 mutants generated by error-prone PCR &amp; tertiary protein structure modelling of temperature-sensitive Cdc45 mutants (PyMOL)</a:t>
             </a:r>
           </a:p>
           <a:p>
@@ -4715,7 +5034,7 @@
                 <a:ea typeface="Geneva" panose="020B0503030404040204" pitchFamily="34" charset="0"/>
                 <a:cs typeface="Verdana" panose="020B0604030504040204" pitchFamily="34" charset="0"/>
               </a:rPr>
-              <a:t>mutation data (from multiple studies) to estimate the variation of the effective population size across the human genome.</a:t>
+              <a:t>mutation data (from multiple studies) to estimate the variation of the effective population size across the human genome</a:t>
             </a:r>
             <a:endParaRPr lang="en-US" sz="600" spc="30" dirty="0">
               <a:solidFill>
@@ -5020,7 +5339,7 @@
                 <a:ea typeface="Geneva" panose="020B0503030404040204" pitchFamily="34" charset="0"/>
                 <a:cs typeface="Verdana" panose="020B0604030504040204" pitchFamily="34" charset="0"/>
               </a:rPr>
-              <a:t> author, submitted (2023)</a:t>
+              <a:t> author, manuscript in development (2023)</a:t>
             </a:r>
           </a:p>
           <a:p>
@@ -5049,7 +5368,7 @@
                 <a:ea typeface="Geneva" panose="020B0503030404040204" pitchFamily="34" charset="0"/>
                 <a:cs typeface="Verdana" panose="020B0604030504040204" pitchFamily="34" charset="0"/>
               </a:rPr>
-              <a:t>Invited review article, 1</a:t>
+              <a:t>Invited review article, joint 1</a:t>
             </a:r>
             <a:r>
               <a:rPr lang="en-GB" sz="600" spc="30" baseline="30000" dirty="0">
@@ -5071,7 +5390,7 @@
                 <a:ea typeface="Geneva" panose="020B0503030404040204" pitchFamily="34" charset="0"/>
                 <a:cs typeface="Verdana" panose="020B0604030504040204" pitchFamily="34" charset="0"/>
               </a:rPr>
-              <a:t> author, submitted (2023)</a:t>
+              <a:t> author, invited review (2023)</a:t>
             </a:r>
           </a:p>
           <a:p>
@@ -5124,55 +5443,6 @@
               </a:rPr>
               <a:t> author, in review (2023)</a:t>
             </a:r>
-          </a:p>
-          <a:p>
-            <a:pPr>
-              <a:spcBef>
-                <a:spcPts val="300"/>
-              </a:spcBef>
-              <a:spcAft>
-                <a:spcPts val="300"/>
-              </a:spcAft>
-            </a:pPr>
-            <a:r>
-              <a:rPr lang="en-GB" sz="600" spc="30" dirty="0">
-                <a:solidFill>
-                  <a:srgbClr val="4F5050"/>
-                </a:solidFill>
-                <a:latin typeface="Geneva" panose="020B0503030404040204" pitchFamily="34" charset="0"/>
-                <a:ea typeface="Geneva" panose="020B0503030404040204" pitchFamily="34" charset="0"/>
-                <a:cs typeface="Verdana" panose="020B0604030504040204" pitchFamily="34" charset="0"/>
-              </a:rPr>
-              <a:t>Two more manuscripts in development</a:t>
-            </a:r>
-            <a:endParaRPr lang="en-US" sz="600" b="1" spc="30" dirty="0">
-              <a:solidFill>
-                <a:srgbClr val="4F5050"/>
-              </a:solidFill>
-              <a:latin typeface="Geneva" panose="020B0503030404040204" pitchFamily="34" charset="0"/>
-              <a:ea typeface="Geneva" panose="020B0503030404040204" pitchFamily="34" charset="0"/>
-              <a:cs typeface="Verdana" panose="020B0604030504040204" pitchFamily="34" charset="0"/>
-            </a:endParaRPr>
-          </a:p>
-          <a:p>
-            <a:pPr marL="428400" lvl="1" indent="-144000">
-              <a:spcBef>
-                <a:spcPts val="200"/>
-              </a:spcBef>
-              <a:spcAft>
-                <a:spcPts val="600"/>
-              </a:spcAft>
-              <a:buFont typeface="Arial" panose="020B0604020202020204" pitchFamily="34" charset="0"/>
-              <a:buChar char="•"/>
-            </a:pPr>
-            <a:endParaRPr lang="en-US" sz="600" dirty="0">
-              <a:solidFill>
-                <a:srgbClr val="4F5050"/>
-              </a:solidFill>
-              <a:latin typeface="Geneva" panose="020B0503030404040204" pitchFamily="34" charset="0"/>
-              <a:ea typeface="Geneva" panose="020B0503030404040204" pitchFamily="34" charset="0"/>
-              <a:cs typeface="Verdana" panose="020B0604030504040204" pitchFamily="34" charset="0"/>
-            </a:endParaRPr>
           </a:p>
         </p:txBody>
       </p:sp>
@@ -5304,7 +5574,7 @@
               <a:p>
                 <a:pPr algn="r"/>
                 <a:r>
-                  <a:rPr lang="en-US" sz="800" dirty="0">
+                  <a:rPr lang="en-US" sz="800" dirty="0" err="1">
                     <a:solidFill>
                       <a:srgbClr val="4F5050"/>
                     </a:solidFill>

</xml_diff>